<commit_message>
fix: Update Cloud Foundations
</commit_message>
<xml_diff>
--- a/cloud_foundations/MentorSession_CloudFoundations-custom.pptx
+++ b/cloud_foundations/MentorSession_CloudFoundations-custom.pptx
@@ -225,7 +225,7 @@
           <a:p>
             <a:fld id="{25188E05-CAD2-491D-93D4-ECB3793357F0}" type="datetimeFigureOut">
               <a:rPr lang="en-IN" smtClean="0"/>
-              <a:t>18/03/23</a:t>
+              <a:t>01/12/23</a:t>
             </a:fld>
             <a:endParaRPr lang="en-IN"/>
           </a:p>
@@ -621,10 +621,332 @@
           <a:bodyPr/>
           <a:lstStyle/>
           <a:p>
-            <a:r>
-              <a:rPr lang="en-US" altLang="en-US"/>
-              <a:t>Reference - https://www.mckinsey.com/business-functions/mckinsey-digital/our-insights/how-cios-and-ctos-can-accelerate-digital-transformations-through-cloud-platforms</a:t>
-            </a:r>
+            <a:pPr lvl="0"/>
+            <a:r>
+              <a:rPr lang="en-US" altLang="en-US" dirty="0">
+                <a:sym typeface="+mn-ea"/>
+              </a:rPr>
+              <a:t>Harvard Business Review - “How Cloud Computing Is Changing Management” https://</a:t>
+            </a:r>
+            <a:r>
+              <a:rPr lang="en-US" altLang="en-US" dirty="0" err="1">
+                <a:sym typeface="+mn-ea"/>
+              </a:rPr>
+              <a:t>hbr.org</a:t>
+            </a:r>
+            <a:r>
+              <a:rPr lang="en-US" altLang="en-US" dirty="0">
+                <a:sym typeface="+mn-ea"/>
+              </a:rPr>
+              <a:t>/2018/02/how-cloud-computing-is-changing-management</a:t>
+            </a:r>
+          </a:p>
+          <a:p>
+            <a:pPr lvl="0"/>
+            <a:endParaRPr lang="en-US" altLang="en-US" dirty="0">
+              <a:sym typeface="+mn-ea"/>
+            </a:endParaRPr>
+          </a:p>
+          <a:p>
+            <a:pPr lvl="0"/>
+            <a:r>
+              <a:rPr lang="en-US" altLang="en-US" dirty="0">
+                <a:sym typeface="+mn-ea"/>
+              </a:rPr>
+              <a:t>The likely outcomes of the move to cloud include changing how products are designed; where we can experience closer collaboration between IT and other business units, including sales, finance and forecasting; and more customer interaction, even to a point of jointly developing products with their consumers. In particular, new ways of writing and deploying software will encourage new types of faster-acting organizational designs.</a:t>
+            </a:r>
+          </a:p>
+          <a:p>
+            <a:pPr lvl="0"/>
+            <a:endParaRPr lang="en-US" altLang="en-US" dirty="0">
+              <a:sym typeface="+mn-ea"/>
+            </a:endParaRPr>
+          </a:p>
+          <a:p>
+            <a:pPr lvl="0"/>
+            <a:r>
+              <a:rPr lang="en-US" altLang="en-US" dirty="0">
+                <a:sym typeface="+mn-ea"/>
+              </a:rPr>
+              <a:t>And this is a big one - historically IT has been looked at as a cost center (INTERNAL: describe what a cost center is), now there is a distinct shift where IT is generating business again by providing the tools that is allowing the business to grow and innovate at an </a:t>
+            </a:r>
+            <a:r>
+              <a:rPr lang="en-US" altLang="en-US" dirty="0" err="1">
+                <a:sym typeface="+mn-ea"/>
+              </a:rPr>
+              <a:t>unprecidented</a:t>
+            </a:r>
+            <a:r>
+              <a:rPr lang="en-US" altLang="en-US" dirty="0">
+                <a:sym typeface="+mn-ea"/>
+              </a:rPr>
+              <a:t> velocity! Revenue transfer to cloud teams/business unit is a reality.</a:t>
+            </a:r>
+          </a:p>
+          <a:p>
+            <a:pPr lvl="0"/>
+            <a:endParaRPr lang="en-US" altLang="en-US" dirty="0">
+              <a:sym typeface="+mn-ea"/>
+            </a:endParaRPr>
+          </a:p>
+          <a:p>
+            <a:pPr lvl="0"/>
+            <a:r>
+              <a:rPr lang="en-US" altLang="en-US" dirty="0">
+                <a:sym typeface="+mn-ea"/>
+              </a:rPr>
+              <a:t>The shift to “cloud native” organizations - “Cloud native” software approaches stresses ease of use and low-impact alteration of components of any given software application. Massive applications are subdivided into a series of “microservices” that can be tweaked with little effect on a running piece of software.</a:t>
+            </a:r>
+          </a:p>
+          <a:p>
+            <a:pPr lvl="0"/>
+            <a:endParaRPr lang="en-US" altLang="en-US" dirty="0">
+              <a:sym typeface="+mn-ea"/>
+            </a:endParaRPr>
+          </a:p>
+          <a:p>
+            <a:pPr lvl="0"/>
+            <a:r>
+              <a:rPr lang="en-US" altLang="en-US" dirty="0">
+                <a:sym typeface="+mn-ea"/>
+              </a:rPr>
+              <a:t>I have to say this - “IT seems to be not just supporting the business but is helping defining it as well”! Well this is good for us!</a:t>
+            </a:r>
+          </a:p>
+          <a:p>
+            <a:endParaRPr lang="en-US" altLang="en-US" dirty="0"/>
+          </a:p>
+          <a:p>
+            <a:r>
+              <a:rPr lang="en-US" b="1" dirty="0"/>
+              <a:t>Notes:</a:t>
+            </a:r>
+            <a:endParaRPr lang="en-US" dirty="0"/>
+          </a:p>
+          <a:p>
+            <a:pPr>
+              <a:buFont typeface="Arial" panose="020B0604020202020204" pitchFamily="34" charset="0"/>
+              <a:buChar char="•"/>
+            </a:pPr>
+            <a:r>
+              <a:rPr lang="en-US" dirty="0"/>
+              <a:t>Shift to "product" centric thinking which combines business units (and customers!) to jointly develop customer services, and plan for the entire product lifecycle and ongoing financing</a:t>
+            </a:r>
+          </a:p>
+          <a:p>
+            <a:pPr>
+              <a:buFont typeface="Arial" panose="020B0604020202020204" pitchFamily="34" charset="0"/>
+              <a:buChar char="•"/>
+            </a:pPr>
+            <a:r>
+              <a:rPr lang="en-US" dirty="0"/>
+              <a:t>a "project" based thinking approach uses defined </a:t>
+            </a:r>
+            <a:r>
+              <a:rPr lang="en-US" dirty="0" err="1"/>
+              <a:t>timeperiod</a:t>
+            </a:r>
+            <a:r>
+              <a:rPr lang="en-US" dirty="0"/>
+              <a:t> for launches, and features, defined or separate teams (""throw-over the wall" to operations), and struggles with IT financing</a:t>
+            </a:r>
+          </a:p>
+          <a:p>
+            <a:pPr>
+              <a:buFont typeface="Arial" panose="020B0604020202020204" pitchFamily="34" charset="0"/>
+              <a:buChar char="•"/>
+            </a:pPr>
+            <a:r>
+              <a:rPr lang="en-US" dirty="0"/>
+              <a:t>Agile, or incremental approach to services and updates (low-impact and shortened feedback loop approach to testing)</a:t>
+            </a:r>
+          </a:p>
+          <a:p>
+            <a:pPr>
+              <a:buFont typeface="Arial" panose="020B0604020202020204" pitchFamily="34" charset="0"/>
+              <a:buChar char="•"/>
+            </a:pPr>
+            <a:r>
+              <a:rPr lang="en-US" dirty="0"/>
+              <a:t>Cloud first and cloud native thinking</a:t>
+            </a:r>
+          </a:p>
+          <a:p>
+            <a:pPr>
+              <a:buFont typeface="Arial" panose="020B0604020202020204" pitchFamily="34" charset="0"/>
+              <a:buChar char="•"/>
+            </a:pPr>
+            <a:r>
+              <a:rPr lang="en-US" dirty="0"/>
+              <a:t>Microservices (one example) for reduced blast radius, and incremental changes</a:t>
+            </a:r>
+          </a:p>
+          <a:p>
+            <a:pPr>
+              <a:buFont typeface="Arial" panose="020B0604020202020204" pitchFamily="34" charset="0"/>
+              <a:buChar char="•"/>
+            </a:pPr>
+            <a:r>
+              <a:rPr lang="en-US" dirty="0"/>
+              <a:t>Shorter feedback loop</a:t>
+            </a:r>
+          </a:p>
+          <a:p>
+            <a:r>
+              <a:rPr lang="en-US" b="1" dirty="0"/>
+              <a:t>Key Takeaways:</a:t>
+            </a:r>
+            <a:endParaRPr lang="en-US" dirty="0"/>
+          </a:p>
+          <a:p>
+            <a:pPr>
+              <a:buFont typeface="Arial" panose="020B0604020202020204" pitchFamily="34" charset="0"/>
+              <a:buChar char="•"/>
+            </a:pPr>
+            <a:r>
+              <a:rPr lang="en-US" dirty="0"/>
+              <a:t>Focus on product and service, not just single aspect or business unit</a:t>
+            </a:r>
+          </a:p>
+          <a:p>
+            <a:pPr>
+              <a:buFont typeface="Arial" panose="020B0604020202020204" pitchFamily="34" charset="0"/>
+              <a:buChar char="•"/>
+            </a:pPr>
+            <a:r>
+              <a:rPr lang="en-US" dirty="0"/>
+              <a:t>IT as value enabler, not cost center</a:t>
+            </a:r>
+          </a:p>
+          <a:p>
+            <a:pPr>
+              <a:buFont typeface="Arial" panose="020B0604020202020204" pitchFamily="34" charset="0"/>
+              <a:buChar char="•"/>
+            </a:pPr>
+            <a:r>
+              <a:rPr lang="en-US" dirty="0"/>
+              <a:t>Data driven approach to features and changes</a:t>
+            </a:r>
+          </a:p>
+          <a:p>
+            <a:pPr>
+              <a:buFont typeface="Arial" panose="020B0604020202020204" pitchFamily="34" charset="0"/>
+              <a:buChar char="•"/>
+            </a:pPr>
+            <a:r>
+              <a:rPr lang="en-US" dirty="0"/>
+              <a:t>Smaller, more rapid incremental changes</a:t>
+            </a:r>
+          </a:p>
+          <a:p>
+            <a:pPr>
+              <a:buFont typeface="Arial" panose="020B0604020202020204" pitchFamily="34" charset="0"/>
+              <a:buChar char="•"/>
+            </a:pPr>
+            <a:r>
+              <a:rPr lang="en-US" dirty="0"/>
+              <a:t>Shifting to ""cloud native", which is using cloud services first (reduce and eliminate non-differentiated </a:t>
+            </a:r>
+            <a:r>
+              <a:rPr lang="en-US" dirty="0" err="1"/>
+              <a:t>activites</a:t>
+            </a:r>
+            <a:r>
+              <a:rPr lang="en-US" dirty="0"/>
+              <a:t> allowing focus on core business).</a:t>
+            </a:r>
+          </a:p>
+          <a:p>
+            <a:r>
+              <a:rPr lang="en-US" b="1" dirty="0"/>
+              <a:t>References:</a:t>
+            </a:r>
+            <a:endParaRPr lang="en-US" dirty="0"/>
+          </a:p>
+          <a:p>
+            <a:pPr>
+              <a:buFont typeface="Arial" panose="020B0604020202020204" pitchFamily="34" charset="0"/>
+              <a:buChar char="•"/>
+            </a:pPr>
+            <a:r>
+              <a:rPr lang="en-US" dirty="0"/>
+              <a:t>3M Health and Information Systems (healthcare) went all in on AWS.</a:t>
+            </a:r>
+          </a:p>
+          <a:p>
+            <a:pPr>
+              <a:buFont typeface="Arial" panose="020B0604020202020204" pitchFamily="34" charset="0"/>
+              <a:buChar char="•"/>
+            </a:pPr>
+            <a:r>
+              <a:rPr lang="en-US" dirty="0"/>
+              <a:t>not an IT company, allowed focus of R&amp;D on healthcare analytics</a:t>
+            </a:r>
+          </a:p>
+          <a:p>
+            <a:pPr>
+              <a:buFont typeface="Arial" panose="020B0604020202020204" pitchFamily="34" charset="0"/>
+              <a:buChar char="•"/>
+            </a:pPr>
+            <a:r>
+              <a:rPr lang="en-US" dirty="0"/>
+              <a:t>apps are glue between patients, healthcare providers, and payers</a:t>
+            </a:r>
+          </a:p>
+          <a:p>
+            <a:pPr>
+              <a:buFont typeface="Arial" panose="020B0604020202020204" pitchFamily="34" charset="0"/>
+              <a:buChar char="•"/>
+            </a:pPr>
+            <a:r>
+              <a:rPr lang="en-US" dirty="0"/>
+              <a:t>benefits?</a:t>
+            </a:r>
+          </a:p>
+          <a:p>
+            <a:pPr>
+              <a:buFont typeface="Arial" panose="020B0604020202020204" pitchFamily="34" charset="0"/>
+              <a:buChar char="•"/>
+            </a:pPr>
+            <a:r>
+              <a:rPr lang="en-US" dirty="0"/>
+              <a:t>reduced provisioning time from 10+ weeks to minutes allowing focus on other areas</a:t>
+            </a:r>
+          </a:p>
+          <a:p>
+            <a:pPr>
+              <a:buFont typeface="Arial" panose="020B0604020202020204" pitchFamily="34" charset="0"/>
+              <a:buChar char="•"/>
+            </a:pPr>
+            <a:r>
+              <a:rPr lang="en-US" dirty="0"/>
+              <a:t>allow massive scale to support spike in customer demands for large data processing requests</a:t>
+            </a:r>
+          </a:p>
+          <a:p>
+            <a:pPr>
+              <a:buFont typeface="Arial" panose="020B0604020202020204" pitchFamily="34" charset="0"/>
+              <a:buChar char="•"/>
+            </a:pPr>
+            <a:r>
+              <a:rPr lang="en-US" dirty="0"/>
+              <a:t>faster innovation, with deployments down to weekly instead of 6 weeks</a:t>
+            </a:r>
+          </a:p>
+          <a:p>
+            <a:pPr marL="0" lvl="0" indent="0" algn="l" rtl="0">
+              <a:spcBef>
+                <a:spcPts val="0"/>
+              </a:spcBef>
+              <a:spcAft>
+                <a:spcPts val="0"/>
+              </a:spcAft>
+              <a:buNone/>
+            </a:pPr>
+            <a:endParaRPr lang="en-US" dirty="0"/>
+          </a:p>
+          <a:p>
+            <a:endParaRPr lang="en-US" altLang="en-US" dirty="0"/>
           </a:p>
         </p:txBody>
       </p:sp>
@@ -680,10 +1002,176 @@
           <a:bodyPr/>
           <a:lstStyle/>
           <a:p>
-            <a:r>
-              <a:rPr lang="en-US" altLang="en-US"/>
-              <a:t>Reference - https://www.mckinsey.com/business-functions/mckinsey-digital/our-insights/how-cios-and-ctos-can-accelerate-digital-transformations-through-cloud-platforms</a:t>
-            </a:r>
+            <a:pPr lvl="0"/>
+            <a:r>
+              <a:rPr lang="en-US" altLang="en-US" dirty="0">
+                <a:sym typeface="+mn-ea"/>
+              </a:rPr>
+              <a:t>Gartner - “Setup your organization for cloud adoption success” https://</a:t>
+            </a:r>
+            <a:r>
+              <a:rPr lang="en-US" altLang="en-US" dirty="0" err="1">
+                <a:sym typeface="+mn-ea"/>
+              </a:rPr>
+              <a:t>www.gartner.com</a:t>
+            </a:r>
+            <a:r>
+              <a:rPr lang="en-US" altLang="en-US" dirty="0">
+                <a:sym typeface="+mn-ea"/>
+              </a:rPr>
+              <a:t>/</a:t>
+            </a:r>
+            <a:r>
+              <a:rPr lang="en-US" altLang="en-US" dirty="0" err="1">
+                <a:sym typeface="+mn-ea"/>
+              </a:rPr>
+              <a:t>en</a:t>
+            </a:r>
+            <a:r>
+              <a:rPr lang="en-US" altLang="en-US" dirty="0">
+                <a:sym typeface="+mn-ea"/>
+              </a:rPr>
+              <a:t>/conferences/hub/cloud-conferences/insights/how-to-build-a-cloud-center-of-excellence</a:t>
+            </a:r>
+          </a:p>
+          <a:p>
+            <a:pPr lvl="0"/>
+            <a:endParaRPr lang="en-US" altLang="en-US" dirty="0">
+              <a:sym typeface="+mn-ea"/>
+            </a:endParaRPr>
+          </a:p>
+          <a:p>
+            <a:pPr lvl="0"/>
+            <a:r>
+              <a:rPr lang="en-US" altLang="en-US" dirty="0">
+                <a:sym typeface="+mn-ea"/>
+              </a:rPr>
+              <a:t>“Enterprise architecture” was and “is” all about business and less about tech. Do you think there is a stark similarity of the enterprise architecture charter with CCOE?</a:t>
+            </a:r>
+          </a:p>
+          <a:p>
+            <a:pPr lvl="0"/>
+            <a:endParaRPr lang="en-US" altLang="en-US" dirty="0">
+              <a:sym typeface="+mn-ea"/>
+            </a:endParaRPr>
+          </a:p>
+          <a:p>
+            <a:pPr lvl="0"/>
+            <a:r>
+              <a:rPr lang="en-US" altLang="en-US" dirty="0">
+                <a:sym typeface="+mn-ea"/>
+              </a:rPr>
+              <a:t>It is also about “Citizen driven development”, give the power at the hands of the grass root foot soldiers, you know like you and me, the people who deliver stuff for our customers. We know what it takes, we know what the problems and how to tackle them. All this knowledge was bottled up, now with democratized tech, we can be product creators! Creators of reusable assets, define best practices, define automation, limitless possibilities! Isn’t it?</a:t>
+            </a:r>
+            <a:endParaRPr lang="en-US" altLang="en-US" dirty="0"/>
+          </a:p>
+          <a:p>
+            <a:endParaRPr lang="en-US" altLang="en-US" dirty="0"/>
+          </a:p>
+          <a:p>
+            <a:r>
+              <a:rPr lang="en-US" b="1" dirty="0"/>
+              <a:t>Notes:</a:t>
+            </a:r>
+            <a:endParaRPr lang="en-US" dirty="0"/>
+          </a:p>
+          <a:p>
+            <a:pPr>
+              <a:buFont typeface="Arial" panose="020B0604020202020204" pitchFamily="34" charset="0"/>
+              <a:buChar char="•"/>
+            </a:pPr>
+            <a:r>
+              <a:rPr lang="en-US" dirty="0"/>
+              <a:t>need right skills and organizational structure</a:t>
+            </a:r>
+          </a:p>
+          <a:p>
+            <a:pPr>
+              <a:buFont typeface="Arial" panose="020B0604020202020204" pitchFamily="34" charset="0"/>
+              <a:buChar char="•"/>
+            </a:pPr>
+            <a:r>
+              <a:rPr lang="en-US" dirty="0"/>
+              <a:t>Will not be as successful (successful) if conforming to old norms, practices, and organization structures</a:t>
+            </a:r>
+          </a:p>
+          <a:p>
+            <a:r>
+              <a:rPr lang="en-US" b="1" dirty="0"/>
+              <a:t>Key </a:t>
+            </a:r>
+            <a:r>
+              <a:rPr lang="en-US" b="1" dirty="0" err="1"/>
+              <a:t>takeways</a:t>
+            </a:r>
+            <a:r>
+              <a:rPr lang="en-US" b="1" dirty="0"/>
+              <a:t>:</a:t>
+            </a:r>
+            <a:endParaRPr lang="en-US" dirty="0"/>
+          </a:p>
+          <a:p>
+            <a:pPr>
+              <a:buFont typeface="Arial" panose="020B0604020202020204" pitchFamily="34" charset="0"/>
+              <a:buChar char="•"/>
+            </a:pPr>
+            <a:r>
+              <a:rPr lang="en-US" dirty="0"/>
+              <a:t>Adopt Cloud Center of Excellence (</a:t>
+            </a:r>
+            <a:r>
+              <a:rPr lang="en-US" dirty="0" err="1"/>
+              <a:t>CCoE</a:t>
+            </a:r>
+            <a:r>
+              <a:rPr lang="en-US" dirty="0"/>
+              <a:t>) to drive practices, provide guidance and oversight and drive innovation</a:t>
+            </a:r>
+          </a:p>
+          <a:p>
+            <a:pPr>
+              <a:buFont typeface="Arial" panose="020B0604020202020204" pitchFamily="34" charset="0"/>
+              <a:buChar char="•"/>
+            </a:pPr>
+            <a:r>
+              <a:rPr lang="en-US" dirty="0"/>
+              <a:t>build up knowledge communities and develop skills</a:t>
+            </a:r>
+          </a:p>
+          <a:p>
+            <a:pPr>
+              <a:buFont typeface="Arial" panose="020B0604020202020204" pitchFamily="34" charset="0"/>
+              <a:buChar char="•"/>
+            </a:pPr>
+            <a:r>
+              <a:rPr lang="en-US" dirty="0"/>
+              <a:t>lunch and learn, developer forums, etc.</a:t>
+            </a:r>
+          </a:p>
+          <a:p>
+            <a:pPr>
+              <a:buFont typeface="Arial" panose="020B0604020202020204" pitchFamily="34" charset="0"/>
+              <a:buChar char="•"/>
+            </a:pPr>
+            <a:r>
+              <a:rPr lang="en-US" dirty="0"/>
+              <a:t>Develop policies, patterns and blueprints, but let teams innovate for their particular use case</a:t>
+            </a:r>
+          </a:p>
+          <a:p>
+            <a:pPr marL="0" lvl="0" indent="0" algn="l" rtl="0">
+              <a:spcBef>
+                <a:spcPts val="0"/>
+              </a:spcBef>
+              <a:spcAft>
+                <a:spcPts val="0"/>
+              </a:spcAft>
+              <a:buNone/>
+            </a:pPr>
+            <a:endParaRPr lang="en-US" dirty="0"/>
+          </a:p>
+          <a:p>
+            <a:endParaRPr lang="en-US" altLang="en-US" dirty="0"/>
           </a:p>
         </p:txBody>
       </p:sp>
@@ -741,7 +1229,7 @@
           <a:p>
             <a:r>
               <a:rPr lang="en-US" altLang="en-US"/>
-              <a:t>Reference - https://www.mckinsey.com/business-functions/mckinsey-digital/our-insights/how-cios-and-ctos-can-accelerate-digital-transformations-through-cloud-platforms</a:t>
+              <a:t>Reference - https://www.mckinsey.com/business-functions/mckinsey-digital/our-insights/capturing-value-in-the-cloud</a:t>
             </a:r>
           </a:p>
         </p:txBody>
@@ -755,6 +1243,183 @@
 </file>
 
 <file path=ppt/notesSlides/notesSlide13.xml><?xml version="1.0" encoding="utf-8"?>
+<p:notes xmlns:a="http://schemas.openxmlformats.org/drawingml/2006/main" xmlns:r="http://schemas.openxmlformats.org/officeDocument/2006/relationships" xmlns:p="http://schemas.openxmlformats.org/presentationml/2006/main">
+  <p:cSld>
+    <p:spTree>
+      <p:nvGrpSpPr>
+        <p:cNvPr id="1" name=""/>
+        <p:cNvGrpSpPr/>
+        <p:nvPr/>
+      </p:nvGrpSpPr>
+      <p:grpSpPr>
+        <a:xfrm>
+          <a:off x="0" y="0"/>
+          <a:ext cx="0" cy="0"/>
+          <a:chOff x="0" y="0"/>
+          <a:chExt cx="0" cy="0"/>
+        </a:xfrm>
+      </p:grpSpPr>
+      <p:sp>
+        <p:nvSpPr>
+          <p:cNvPr id="2" name="Slide Image Placeholder 1"/>
+          <p:cNvSpPr>
+            <a:spLocks noGrp="1" noRot="1" noChangeAspect="1"/>
+          </p:cNvSpPr>
+          <p:nvPr>
+            <p:ph type="sldImg" idx="2"/>
+          </p:nvPr>
+        </p:nvSpPr>
+        <p:spPr/>
+      </p:sp>
+      <p:sp>
+        <p:nvSpPr>
+          <p:cNvPr id="3" name="Text Placeholder 2"/>
+          <p:cNvSpPr>
+            <a:spLocks noGrp="1"/>
+          </p:cNvSpPr>
+          <p:nvPr>
+            <p:ph type="body" idx="3"/>
+          </p:nvPr>
+        </p:nvSpPr>
+        <p:spPr/>
+        <p:txBody>
+          <a:bodyPr/>
+          <a:lstStyle/>
+          <a:p>
+            <a:r>
+              <a:rPr lang="en-US" altLang="en-US"/>
+              <a:t>Reference - https://www.mckinsey.com/business-functions/mckinsey-digital/our-insights/how-cios-and-ctos-can-accelerate-digital-transformations-through-cloud-platforms</a:t>
+            </a:r>
+          </a:p>
+        </p:txBody>
+      </p:sp>
+    </p:spTree>
+  </p:cSld>
+  <p:clrMapOvr>
+    <a:masterClrMapping/>
+  </p:clrMapOvr>
+</p:notes>
+</file>
+
+<file path=ppt/notesSlides/notesSlide14.xml><?xml version="1.0" encoding="utf-8"?>
+<p:notes xmlns:a="http://schemas.openxmlformats.org/drawingml/2006/main" xmlns:r="http://schemas.openxmlformats.org/officeDocument/2006/relationships" xmlns:p="http://schemas.openxmlformats.org/presentationml/2006/main">
+  <p:cSld>
+    <p:spTree>
+      <p:nvGrpSpPr>
+        <p:cNvPr id="1" name=""/>
+        <p:cNvGrpSpPr/>
+        <p:nvPr/>
+      </p:nvGrpSpPr>
+      <p:grpSpPr>
+        <a:xfrm>
+          <a:off x="0" y="0"/>
+          <a:ext cx="0" cy="0"/>
+          <a:chOff x="0" y="0"/>
+          <a:chExt cx="0" cy="0"/>
+        </a:xfrm>
+      </p:grpSpPr>
+      <p:sp>
+        <p:nvSpPr>
+          <p:cNvPr id="2" name="Slide Image Placeholder 1"/>
+          <p:cNvSpPr>
+            <a:spLocks noGrp="1" noRot="1" noChangeAspect="1"/>
+          </p:cNvSpPr>
+          <p:nvPr>
+            <p:ph type="sldImg" idx="2"/>
+          </p:nvPr>
+        </p:nvSpPr>
+        <p:spPr/>
+      </p:sp>
+      <p:sp>
+        <p:nvSpPr>
+          <p:cNvPr id="3" name="Text Placeholder 2"/>
+          <p:cNvSpPr>
+            <a:spLocks noGrp="1"/>
+          </p:cNvSpPr>
+          <p:nvPr>
+            <p:ph type="body" idx="3"/>
+          </p:nvPr>
+        </p:nvSpPr>
+        <p:spPr/>
+        <p:txBody>
+          <a:bodyPr/>
+          <a:lstStyle/>
+          <a:p>
+            <a:r>
+              <a:rPr lang="en-US" altLang="en-US"/>
+              <a:t>Reference - https://www.mckinsey.com/business-functions/mckinsey-digital/our-insights/how-cios-and-ctos-can-accelerate-digital-transformations-through-cloud-platforms</a:t>
+            </a:r>
+          </a:p>
+        </p:txBody>
+      </p:sp>
+    </p:spTree>
+  </p:cSld>
+  <p:clrMapOvr>
+    <a:masterClrMapping/>
+  </p:clrMapOvr>
+</p:notes>
+</file>
+
+<file path=ppt/notesSlides/notesSlide15.xml><?xml version="1.0" encoding="utf-8"?>
+<p:notes xmlns:a="http://schemas.openxmlformats.org/drawingml/2006/main" xmlns:r="http://schemas.openxmlformats.org/officeDocument/2006/relationships" xmlns:p="http://schemas.openxmlformats.org/presentationml/2006/main">
+  <p:cSld>
+    <p:spTree>
+      <p:nvGrpSpPr>
+        <p:cNvPr id="1" name=""/>
+        <p:cNvGrpSpPr/>
+        <p:nvPr/>
+      </p:nvGrpSpPr>
+      <p:grpSpPr>
+        <a:xfrm>
+          <a:off x="0" y="0"/>
+          <a:ext cx="0" cy="0"/>
+          <a:chOff x="0" y="0"/>
+          <a:chExt cx="0" cy="0"/>
+        </a:xfrm>
+      </p:grpSpPr>
+      <p:sp>
+        <p:nvSpPr>
+          <p:cNvPr id="2" name="Slide Image Placeholder 1"/>
+          <p:cNvSpPr>
+            <a:spLocks noGrp="1" noRot="1" noChangeAspect="1"/>
+          </p:cNvSpPr>
+          <p:nvPr>
+            <p:ph type="sldImg" idx="2"/>
+          </p:nvPr>
+        </p:nvSpPr>
+        <p:spPr/>
+      </p:sp>
+      <p:sp>
+        <p:nvSpPr>
+          <p:cNvPr id="3" name="Text Placeholder 2"/>
+          <p:cNvSpPr>
+            <a:spLocks noGrp="1"/>
+          </p:cNvSpPr>
+          <p:nvPr>
+            <p:ph type="body" idx="3"/>
+          </p:nvPr>
+        </p:nvSpPr>
+        <p:spPr/>
+        <p:txBody>
+          <a:bodyPr/>
+          <a:lstStyle/>
+          <a:p>
+            <a:r>
+              <a:rPr lang="en-US" altLang="en-US"/>
+              <a:t>Reference - https://www.mckinsey.com/business-functions/mckinsey-digital/our-insights/how-cios-and-ctos-can-accelerate-digital-transformations-through-cloud-platforms</a:t>
+            </a:r>
+          </a:p>
+        </p:txBody>
+      </p:sp>
+    </p:spTree>
+  </p:cSld>
+  <p:clrMapOvr>
+    <a:masterClrMapping/>
+  </p:clrMapOvr>
+</p:notes>
+</file>
+
+<file path=ppt/notesSlides/notesSlide16.xml><?xml version="1.0" encoding="utf-8"?>
 <p:notes xmlns:a="http://schemas.openxmlformats.org/drawingml/2006/main" xmlns:r="http://schemas.openxmlformats.org/officeDocument/2006/relationships" xmlns:p="http://schemas.openxmlformats.org/presentationml/2006/main">
   <p:cSld>
     <p:spTree>
@@ -884,7 +1549,7 @@
           <a:p>
             <a:r>
               <a:rPr lang="en-US" dirty="0"/>
-              <a:t>Cloud providers may present the service in different ways via the web console but concepts are similar. For example both providers have the same attributes - </a:t>
+              <a:t>Cloud providers may present the service in different ways via the web console, but concepts are similar. For example, both providers have the same attributes - </a:t>
             </a:r>
             <a:r>
               <a:rPr lang="en-US" dirty="0" err="1"/>
@@ -939,6 +1604,684 @@
 </file>
 
 <file path=ppt/notesSlides/notesSlide3.xml><?xml version="1.0" encoding="utf-8"?>
+<p:notes xmlns:a="http://schemas.openxmlformats.org/drawingml/2006/main" xmlns:r="http://schemas.openxmlformats.org/officeDocument/2006/relationships" xmlns:p="http://schemas.openxmlformats.org/presentationml/2006/main">
+  <p:cSld>
+    <p:spTree>
+      <p:nvGrpSpPr>
+        <p:cNvPr id="1" name=""/>
+        <p:cNvGrpSpPr/>
+        <p:nvPr/>
+      </p:nvGrpSpPr>
+      <p:grpSpPr>
+        <a:xfrm>
+          <a:off x="0" y="0"/>
+          <a:ext cx="0" cy="0"/>
+          <a:chOff x="0" y="0"/>
+          <a:chExt cx="0" cy="0"/>
+        </a:xfrm>
+      </p:grpSpPr>
+      <p:sp>
+        <p:nvSpPr>
+          <p:cNvPr id="2" name="Slide Image Placeholder 1"/>
+          <p:cNvSpPr>
+            <a:spLocks noGrp="1" noRot="1" noChangeAspect="1"/>
+          </p:cNvSpPr>
+          <p:nvPr>
+            <p:ph type="sldImg"/>
+          </p:nvPr>
+        </p:nvSpPr>
+        <p:spPr/>
+      </p:sp>
+      <p:sp>
+        <p:nvSpPr>
+          <p:cNvPr id="3" name="Notes Placeholder 2"/>
+          <p:cNvSpPr>
+            <a:spLocks noGrp="1"/>
+          </p:cNvSpPr>
+          <p:nvPr>
+            <p:ph type="body" idx="1"/>
+          </p:nvPr>
+        </p:nvSpPr>
+        <p:spPr/>
+        <p:txBody>
+          <a:bodyPr/>
+          <a:lstStyle/>
+          <a:p>
+            <a:pPr marL="0" marR="0" lvl="0" indent="0" algn="l" defTabSz="914400" rtl="0" eaLnBrk="1" fontAlgn="auto" latinLnBrk="0" hangingPunct="1">
+              <a:lnSpc>
+                <a:spcPct val="100000"/>
+              </a:lnSpc>
+              <a:spcBef>
+                <a:spcPts val="0"/>
+              </a:spcBef>
+              <a:spcAft>
+                <a:spcPts val="0"/>
+              </a:spcAft>
+              <a:buClrTx/>
+              <a:buSzTx/>
+              <a:buFontTx/>
+              <a:buNone/>
+              <a:tabLst/>
+              <a:defRPr/>
+            </a:pPr>
+            <a:r>
+              <a:rPr lang="en-US" dirty="0"/>
+              <a:t>Cloud elasticity is the ability of a cloud computing system to automatically adjust the amount of resources allocated to it based on the current demand. This means that the system can scale up or down its resources as needed, without any manual intervention. Elasticity is important because it allows cloud systems to handle sudden spikes in traffic or usage without crashing or slowing down.</a:t>
+            </a:r>
+          </a:p>
+          <a:p>
+            <a:pPr marL="0" marR="0" lvl="0" indent="0" algn="l" defTabSz="914400" rtl="0" eaLnBrk="1" fontAlgn="auto" latinLnBrk="0" hangingPunct="1">
+              <a:lnSpc>
+                <a:spcPct val="100000"/>
+              </a:lnSpc>
+              <a:spcBef>
+                <a:spcPts val="0"/>
+              </a:spcBef>
+              <a:spcAft>
+                <a:spcPts val="0"/>
+              </a:spcAft>
+              <a:buClrTx/>
+              <a:buSzTx/>
+              <a:buFontTx/>
+              <a:buNone/>
+              <a:tabLst/>
+              <a:defRPr/>
+            </a:pPr>
+            <a:endParaRPr lang="en-US" dirty="0"/>
+          </a:p>
+          <a:p>
+            <a:pPr marL="0" marR="0" lvl="0" indent="0" algn="l" defTabSz="914400" rtl="0" eaLnBrk="1" fontAlgn="auto" latinLnBrk="0" hangingPunct="1">
+              <a:lnSpc>
+                <a:spcPct val="100000"/>
+              </a:lnSpc>
+              <a:spcBef>
+                <a:spcPts val="0"/>
+              </a:spcBef>
+              <a:spcAft>
+                <a:spcPts val="0"/>
+              </a:spcAft>
+              <a:buClrTx/>
+              <a:buSzTx/>
+              <a:buFontTx/>
+              <a:buNone/>
+              <a:tabLst/>
+              <a:defRPr/>
+            </a:pPr>
+            <a:r>
+              <a:rPr lang="en-US" dirty="0"/>
+              <a:t>Scalability, on the other hand, refers to the ability of a system to handle increasing amounts of work by adding more resources. While scalability is also important, it differs from elasticity in that it requires manual intervention to add more resources. In other words, scalability is a proactive approach to handling increased demand, while elasticity is a reactive approach.</a:t>
+            </a:r>
+          </a:p>
+          <a:p>
+            <a:pPr marL="0" marR="0" lvl="0" indent="0" algn="l" defTabSz="914400" rtl="0" eaLnBrk="1" fontAlgn="auto" latinLnBrk="0" hangingPunct="1">
+              <a:lnSpc>
+                <a:spcPct val="100000"/>
+              </a:lnSpc>
+              <a:spcBef>
+                <a:spcPts val="0"/>
+              </a:spcBef>
+              <a:spcAft>
+                <a:spcPts val="0"/>
+              </a:spcAft>
+              <a:buClrTx/>
+              <a:buSzTx/>
+              <a:buFontTx/>
+              <a:buNone/>
+              <a:tabLst/>
+              <a:defRPr/>
+            </a:pPr>
+            <a:endParaRPr lang="en-US" dirty="0"/>
+          </a:p>
+          <a:p>
+            <a:pPr marL="0" marR="0" lvl="0" indent="0" algn="l" defTabSz="914400" rtl="0" eaLnBrk="1" fontAlgn="auto" latinLnBrk="0" hangingPunct="1">
+              <a:lnSpc>
+                <a:spcPct val="100000"/>
+              </a:lnSpc>
+              <a:spcBef>
+                <a:spcPts val="0"/>
+              </a:spcBef>
+              <a:spcAft>
+                <a:spcPts val="0"/>
+              </a:spcAft>
+              <a:buClrTx/>
+              <a:buSzTx/>
+              <a:buFontTx/>
+              <a:buNone/>
+              <a:tabLst/>
+              <a:defRPr/>
+            </a:pPr>
+            <a:r>
+              <a:rPr lang="en-US"/>
+              <a:t>To summarize, cloud elasticity is the ability of a cloud system to automatically adjust its resources based on demand, while scalability is the ability of a system to handle increased demand by adding more resources manually.</a:t>
+            </a:r>
+            <a:endParaRPr lang="en-US" dirty="0"/>
+          </a:p>
+          <a:p>
+            <a:pPr marL="0" marR="0" lvl="0" indent="0" algn="l" defTabSz="914400" rtl="0" eaLnBrk="1" fontAlgn="auto" latinLnBrk="0" hangingPunct="1">
+              <a:lnSpc>
+                <a:spcPct val="100000"/>
+              </a:lnSpc>
+              <a:spcBef>
+                <a:spcPts val="0"/>
+              </a:spcBef>
+              <a:spcAft>
+                <a:spcPts val="0"/>
+              </a:spcAft>
+              <a:buClrTx/>
+              <a:buSzTx/>
+              <a:buFontTx/>
+              <a:buNone/>
+              <a:tabLst/>
+              <a:defRPr/>
+            </a:pPr>
+            <a:endParaRPr lang="en-US" dirty="0"/>
+          </a:p>
+          <a:p>
+            <a:pPr marL="0" marR="0" lvl="0" indent="0" algn="l" defTabSz="914400" rtl="0" eaLnBrk="1" fontAlgn="auto" latinLnBrk="0" hangingPunct="1">
+              <a:lnSpc>
+                <a:spcPct val="100000"/>
+              </a:lnSpc>
+              <a:spcBef>
+                <a:spcPts val="0"/>
+              </a:spcBef>
+              <a:spcAft>
+                <a:spcPts val="0"/>
+              </a:spcAft>
+              <a:buClrTx/>
+              <a:buSzTx/>
+              <a:buFontTx/>
+              <a:buNone/>
+              <a:tabLst/>
+              <a:defRPr/>
+            </a:pPr>
+            <a:r>
+              <a:rPr lang="en-US" dirty="0"/>
+              <a:t>Think of scalability and elasticity as two tools for managing your cloud resources. </a:t>
+            </a:r>
+            <a:r>
+              <a:rPr lang="en-US" b="1" dirty="0"/>
+              <a:t>Scalability helps you handle predictable growth, while elasticity helps you deal with unexpected spikes in demand.</a:t>
+            </a:r>
+            <a:endParaRPr lang="en-US" dirty="0"/>
+          </a:p>
+          <a:p>
+            <a:endParaRPr lang="en-US" dirty="0"/>
+          </a:p>
+        </p:txBody>
+      </p:sp>
+      <p:sp>
+        <p:nvSpPr>
+          <p:cNvPr id="4" name="Slide Number Placeholder 3"/>
+          <p:cNvSpPr>
+            <a:spLocks noGrp="1"/>
+          </p:cNvSpPr>
+          <p:nvPr>
+            <p:ph type="sldNum" sz="quarter" idx="5"/>
+          </p:nvPr>
+        </p:nvSpPr>
+        <p:spPr/>
+        <p:txBody>
+          <a:bodyPr/>
+          <a:lstStyle/>
+          <a:p>
+            <a:fld id="{74552BB5-5DBE-4ABE-AD80-5ED01C1C7C64}" type="slidenum">
+              <a:rPr lang="en-IN" smtClean="0"/>
+              <a:t>3</a:t>
+            </a:fld>
+            <a:endParaRPr lang="en-IN"/>
+          </a:p>
+        </p:txBody>
+      </p:sp>
+    </p:spTree>
+    <p:extLst>
+      <p:ext uri="{BB962C8B-B14F-4D97-AF65-F5344CB8AC3E}">
+        <p14:creationId xmlns:p14="http://schemas.microsoft.com/office/powerpoint/2010/main" val="2093021490"/>
+      </p:ext>
+    </p:extLst>
+  </p:cSld>
+  <p:clrMapOvr>
+    <a:masterClrMapping/>
+  </p:clrMapOvr>
+</p:notes>
+</file>
+
+<file path=ppt/notesSlides/notesSlide4.xml><?xml version="1.0" encoding="utf-8"?>
+<p:notes xmlns:a="http://schemas.openxmlformats.org/drawingml/2006/main" xmlns:r="http://schemas.openxmlformats.org/officeDocument/2006/relationships" xmlns:p="http://schemas.openxmlformats.org/presentationml/2006/main">
+  <p:cSld>
+    <p:spTree>
+      <p:nvGrpSpPr>
+        <p:cNvPr id="1" name=""/>
+        <p:cNvGrpSpPr/>
+        <p:nvPr/>
+      </p:nvGrpSpPr>
+      <p:grpSpPr>
+        <a:xfrm>
+          <a:off x="0" y="0"/>
+          <a:ext cx="0" cy="0"/>
+          <a:chOff x="0" y="0"/>
+          <a:chExt cx="0" cy="0"/>
+        </a:xfrm>
+      </p:grpSpPr>
+      <p:sp>
+        <p:nvSpPr>
+          <p:cNvPr id="2" name="Slide Image Placeholder 1"/>
+          <p:cNvSpPr>
+            <a:spLocks noGrp="1" noRot="1" noChangeAspect="1"/>
+          </p:cNvSpPr>
+          <p:nvPr>
+            <p:ph type="sldImg"/>
+          </p:nvPr>
+        </p:nvSpPr>
+        <p:spPr/>
+      </p:sp>
+      <p:sp>
+        <p:nvSpPr>
+          <p:cNvPr id="3" name="Notes Placeholder 2"/>
+          <p:cNvSpPr>
+            <a:spLocks noGrp="1"/>
+          </p:cNvSpPr>
+          <p:nvPr>
+            <p:ph type="body" idx="1"/>
+          </p:nvPr>
+        </p:nvSpPr>
+        <p:spPr/>
+        <p:txBody>
+          <a:bodyPr/>
+          <a:lstStyle/>
+          <a:p>
+            <a:r>
+              <a:rPr lang="en-US" dirty="0"/>
+              <a:t>A load balancer is a device that distributes incoming network traffic across multiple servers to ensure that no single server is overwhelmed with requests. It helps to improve the performance, reliability, and availability of applications by ensuring that they are always available to users.</a:t>
+            </a:r>
+          </a:p>
+          <a:p>
+            <a:endParaRPr lang="en-US" dirty="0"/>
+          </a:p>
+          <a:p>
+            <a:r>
+              <a:rPr lang="en-US" dirty="0"/>
+              <a:t>Load balancers have several advantages over DNS, including:</a:t>
+            </a:r>
+          </a:p>
+          <a:p>
+            <a:endParaRPr lang="en-US" dirty="0"/>
+          </a:p>
+          <a:p>
+            <a:r>
+              <a:rPr lang="en-US" dirty="0"/>
+              <a:t>- </a:t>
+            </a:r>
+            <a:r>
+              <a:rPr lang="en-US" b="1" dirty="0"/>
+              <a:t>Reliability</a:t>
+            </a:r>
+            <a:r>
+              <a:rPr lang="en-US" dirty="0"/>
+              <a:t>: Load balancers can detect when a server is down and redirect traffic to other servers, ensuring that users can always access the application. DNS typically performs no health check.</a:t>
+            </a:r>
+          </a:p>
+          <a:p>
+            <a:r>
+              <a:rPr lang="en-US" dirty="0"/>
+              <a:t>- </a:t>
+            </a:r>
+            <a:r>
+              <a:rPr lang="en-US" b="1" dirty="0"/>
+              <a:t>Scalability</a:t>
+            </a:r>
+            <a:r>
+              <a:rPr lang="en-US" dirty="0"/>
+              <a:t>: Load balancers can distribute traffic evenly across multiple servers, allowing applications to scale horizontally as demand increases. DNS typically uses simple round-robin.</a:t>
+            </a:r>
+          </a:p>
+          <a:p>
+            <a:r>
+              <a:rPr lang="en-US" dirty="0"/>
+              <a:t>- </a:t>
+            </a:r>
+            <a:r>
+              <a:rPr lang="en-US" b="1" dirty="0"/>
+              <a:t>Security</a:t>
+            </a:r>
+            <a:r>
+              <a:rPr lang="en-US" dirty="0"/>
+              <a:t>: Load balancers can protect applications from common network attacks, such as DDoS attacks, by filtering traffic and blocking malicious requests.</a:t>
+            </a:r>
+          </a:p>
+          <a:p>
+            <a:r>
+              <a:rPr lang="en-US" dirty="0"/>
+              <a:t>- </a:t>
+            </a:r>
+            <a:r>
+              <a:rPr lang="en-US" b="1" dirty="0"/>
+              <a:t>Flexibility</a:t>
+            </a:r>
+            <a:r>
+              <a:rPr lang="en-US" dirty="0"/>
+              <a:t>: Load balancers can be configured to route traffic based on a variety of factors, such as server health, user session, path, or header information.</a:t>
+            </a:r>
+          </a:p>
+          <a:p>
+            <a:r>
+              <a:rPr lang="en-US" dirty="0"/>
+              <a:t>- </a:t>
+            </a:r>
+            <a:r>
+              <a:rPr lang="en-US" b="1" dirty="0"/>
+              <a:t>Performance</a:t>
+            </a:r>
+            <a:r>
+              <a:rPr lang="en-US" dirty="0"/>
+              <a:t>: Load balancers can improve application performance by directing users to the server that has the least amount of traffic.</a:t>
+            </a:r>
+          </a:p>
+          <a:p>
+            <a:endParaRPr lang="en-US" dirty="0"/>
+          </a:p>
+          <a:p>
+            <a:r>
+              <a:rPr lang="en-US" dirty="0"/>
+              <a:t>DNS, on the other hand, is a naming system that translates domain names into IP addresses. While DNS can be used to distribute traffic across multiple servers, it lacks the advanced features and capabilities of a dedicated load balancer.</a:t>
+            </a:r>
+          </a:p>
+          <a:p>
+            <a:endParaRPr lang="en-US" dirty="0"/>
+          </a:p>
+        </p:txBody>
+      </p:sp>
+      <p:sp>
+        <p:nvSpPr>
+          <p:cNvPr id="4" name="Slide Number Placeholder 3"/>
+          <p:cNvSpPr>
+            <a:spLocks noGrp="1"/>
+          </p:cNvSpPr>
+          <p:nvPr>
+            <p:ph type="sldNum" sz="quarter" idx="5"/>
+          </p:nvPr>
+        </p:nvSpPr>
+        <p:spPr/>
+        <p:txBody>
+          <a:bodyPr/>
+          <a:lstStyle/>
+          <a:p>
+            <a:fld id="{74552BB5-5DBE-4ABE-AD80-5ED01C1C7C64}" type="slidenum">
+              <a:rPr lang="en-IN" smtClean="0"/>
+              <a:t>4</a:t>
+            </a:fld>
+            <a:endParaRPr lang="en-IN"/>
+          </a:p>
+        </p:txBody>
+      </p:sp>
+    </p:spTree>
+    <p:extLst>
+      <p:ext uri="{BB962C8B-B14F-4D97-AF65-F5344CB8AC3E}">
+        <p14:creationId xmlns:p14="http://schemas.microsoft.com/office/powerpoint/2010/main" val="3598984611"/>
+      </p:ext>
+    </p:extLst>
+  </p:cSld>
+  <p:clrMapOvr>
+    <a:masterClrMapping/>
+  </p:clrMapOvr>
+</p:notes>
+</file>
+
+<file path=ppt/notesSlides/notesSlide5.xml><?xml version="1.0" encoding="utf-8"?>
+<p:notes xmlns:a="http://schemas.openxmlformats.org/drawingml/2006/main" xmlns:r="http://schemas.openxmlformats.org/officeDocument/2006/relationships" xmlns:p="http://schemas.openxmlformats.org/presentationml/2006/main">
+  <p:cSld>
+    <p:spTree>
+      <p:nvGrpSpPr>
+        <p:cNvPr id="1" name=""/>
+        <p:cNvGrpSpPr/>
+        <p:nvPr/>
+      </p:nvGrpSpPr>
+      <p:grpSpPr>
+        <a:xfrm>
+          <a:off x="0" y="0"/>
+          <a:ext cx="0" cy="0"/>
+          <a:chOff x="0" y="0"/>
+          <a:chExt cx="0" cy="0"/>
+        </a:xfrm>
+      </p:grpSpPr>
+      <p:sp>
+        <p:nvSpPr>
+          <p:cNvPr id="2" name="Slide Image Placeholder 1"/>
+          <p:cNvSpPr>
+            <a:spLocks noGrp="1" noRot="1" noChangeAspect="1"/>
+          </p:cNvSpPr>
+          <p:nvPr>
+            <p:ph type="sldImg"/>
+          </p:nvPr>
+        </p:nvSpPr>
+        <p:spPr/>
+      </p:sp>
+      <p:sp>
+        <p:nvSpPr>
+          <p:cNvPr id="3" name="Notes Placeholder 2"/>
+          <p:cNvSpPr>
+            <a:spLocks noGrp="1"/>
+          </p:cNvSpPr>
+          <p:nvPr>
+            <p:ph type="body" idx="1"/>
+          </p:nvPr>
+        </p:nvSpPr>
+        <p:spPr/>
+        <p:txBody>
+          <a:bodyPr/>
+          <a:lstStyle/>
+          <a:p>
+            <a:pPr algn="l"/>
+            <a:r>
+              <a:rPr lang="en-US" b="0" i="0" dirty="0">
+                <a:solidFill>
+                  <a:srgbClr val="000000"/>
+                </a:solidFill>
+                <a:effectLst/>
+              </a:rPr>
+              <a:t>Object storage is a computer data storage architecture designed to handle large amounts of unstructured data. Unlike other architectures, it designates data as distinct units, bundled with metadata and a unique identifier that can be used to locate and access each data unit. These units, or objects, can be stored on-premises, but are typically stored in the cloud, making them easily accessible from anywhere. Object storage is ideal for storing static content, data archives, and backups.</a:t>
+            </a:r>
+          </a:p>
+          <a:p>
+            <a:pPr algn="l"/>
+            <a:endParaRPr lang="en-US" b="0" i="0" dirty="0">
+              <a:solidFill>
+                <a:srgbClr val="000000"/>
+              </a:solidFill>
+              <a:effectLst/>
+            </a:endParaRPr>
+          </a:p>
+          <a:p>
+            <a:pPr algn="l"/>
+            <a:r>
+              <a:rPr lang="en-US" b="0" i="0" dirty="0">
+                <a:solidFill>
+                  <a:srgbClr val="000000"/>
+                </a:solidFill>
+                <a:effectLst/>
+              </a:rPr>
+              <a:t>Some of the benefits of object storage over other storage types include:</a:t>
+            </a:r>
+          </a:p>
+          <a:p>
+            <a:pPr algn="l"/>
+            <a:endParaRPr lang="en-US" b="0" i="0" dirty="0">
+              <a:solidFill>
+                <a:srgbClr val="000000"/>
+              </a:solidFill>
+              <a:effectLst/>
+            </a:endParaRPr>
+          </a:p>
+          <a:p>
+            <a:pPr marL="171450" indent="-171450" algn="l">
+              <a:buFont typeface="Arial" panose="020B0604020202020204" pitchFamily="34" charset="0"/>
+              <a:buChar char="•"/>
+            </a:pPr>
+            <a:r>
+              <a:rPr lang="en-US" b="1" i="0" dirty="0">
+                <a:solidFill>
+                  <a:srgbClr val="000000"/>
+                </a:solidFill>
+                <a:effectLst/>
+              </a:rPr>
+              <a:t>Scalability</a:t>
+            </a:r>
+            <a:r>
+              <a:rPr lang="en-US" b="0" i="0" dirty="0">
+                <a:solidFill>
+                  <a:srgbClr val="000000"/>
+                </a:solidFill>
+                <a:effectLst/>
+              </a:rPr>
+              <a:t> - Object storage is highly scalable and can handle massive amounts of data.</a:t>
+            </a:r>
+          </a:p>
+          <a:p>
+            <a:pPr marL="171450" indent="-171450" algn="l">
+              <a:buFont typeface="Arial" panose="020B0604020202020204" pitchFamily="34" charset="0"/>
+              <a:buChar char="•"/>
+            </a:pPr>
+            <a:r>
+              <a:rPr lang="en-US" b="1" i="0" dirty="0">
+                <a:solidFill>
+                  <a:srgbClr val="000000"/>
+                </a:solidFill>
+                <a:effectLst/>
+              </a:rPr>
+              <a:t>Cost-effectiveness</a:t>
+            </a:r>
+            <a:r>
+              <a:rPr lang="en-US" b="0" i="0" dirty="0">
+                <a:solidFill>
+                  <a:srgbClr val="000000"/>
+                </a:solidFill>
+                <a:effectLst/>
+              </a:rPr>
+              <a:t> – object storage can reduce costs by up to 80% compared to an enterprise filer</a:t>
+            </a:r>
+          </a:p>
+          <a:p>
+            <a:pPr marL="171450" indent="-171450" algn="l">
+              <a:buFont typeface="Arial" panose="020B0604020202020204" pitchFamily="34" charset="0"/>
+              <a:buChar char="•"/>
+            </a:pPr>
+            <a:r>
+              <a:rPr lang="en-US" b="1" i="0" dirty="0">
+                <a:solidFill>
+                  <a:srgbClr val="000000"/>
+                </a:solidFill>
+                <a:effectLst/>
+              </a:rPr>
+              <a:t>Ease of use </a:t>
+            </a:r>
+            <a:r>
+              <a:rPr lang="en-US" b="0" i="0" dirty="0">
+                <a:solidFill>
+                  <a:srgbClr val="000000"/>
+                </a:solidFill>
+                <a:effectLst/>
+              </a:rPr>
+              <a:t>– Object storage has a simple REST API and permission model</a:t>
+            </a:r>
+          </a:p>
+          <a:p>
+            <a:pPr marL="171450" indent="-171450" algn="l">
+              <a:buFont typeface="Arial" panose="020B0604020202020204" pitchFamily="34" charset="0"/>
+              <a:buChar char="•"/>
+            </a:pPr>
+            <a:r>
+              <a:rPr lang="en-US" b="1" i="0" dirty="0">
+                <a:solidFill>
+                  <a:srgbClr val="000000"/>
+                </a:solidFill>
+                <a:effectLst/>
+              </a:rPr>
+              <a:t>Durability </a:t>
+            </a:r>
+            <a:r>
+              <a:rPr lang="en-US" b="0" i="0" dirty="0">
+                <a:solidFill>
+                  <a:srgbClr val="000000"/>
+                </a:solidFill>
+                <a:effectLst/>
+              </a:rPr>
+              <a:t>– Object storage is designed to provide high durability and available for data</a:t>
+            </a:r>
+          </a:p>
+          <a:p>
+            <a:pPr marL="171450" indent="-171450" algn="l">
+              <a:buFont typeface="Arial" panose="020B0604020202020204" pitchFamily="34" charset="0"/>
+              <a:buChar char="•"/>
+            </a:pPr>
+            <a:r>
+              <a:rPr lang="en-US" b="1" i="0" dirty="0">
+                <a:solidFill>
+                  <a:srgbClr val="000000"/>
+                </a:solidFill>
+                <a:effectLst/>
+              </a:rPr>
+              <a:t>Efficiency </a:t>
+            </a:r>
+            <a:r>
+              <a:rPr lang="en-US" b="0" i="0" dirty="0">
+                <a:solidFill>
+                  <a:srgbClr val="000000"/>
+                </a:solidFill>
+                <a:effectLst/>
+              </a:rPr>
+              <a:t>– Object storage is efficient for storing large amounts of unstructured data</a:t>
+            </a:r>
+          </a:p>
+          <a:p>
+            <a:pPr marL="171450" indent="-171450" algn="l">
+              <a:buFont typeface="Arial" panose="020B0604020202020204" pitchFamily="34" charset="0"/>
+              <a:buChar char="•"/>
+            </a:pPr>
+            <a:endParaRPr lang="en-US" b="0" i="0" dirty="0">
+              <a:solidFill>
+                <a:srgbClr val="000000"/>
+              </a:solidFill>
+              <a:effectLst/>
+            </a:endParaRPr>
+          </a:p>
+        </p:txBody>
+      </p:sp>
+      <p:sp>
+        <p:nvSpPr>
+          <p:cNvPr id="4" name="Slide Number Placeholder 3"/>
+          <p:cNvSpPr>
+            <a:spLocks noGrp="1"/>
+          </p:cNvSpPr>
+          <p:nvPr>
+            <p:ph type="sldNum" sz="quarter" idx="5"/>
+          </p:nvPr>
+        </p:nvSpPr>
+        <p:spPr/>
+        <p:txBody>
+          <a:bodyPr/>
+          <a:lstStyle/>
+          <a:p>
+            <a:fld id="{74552BB5-5DBE-4ABE-AD80-5ED01C1C7C64}" type="slidenum">
+              <a:rPr lang="en-IN" smtClean="0"/>
+              <a:t>5</a:t>
+            </a:fld>
+            <a:endParaRPr lang="en-IN"/>
+          </a:p>
+        </p:txBody>
+      </p:sp>
+    </p:spTree>
+    <p:extLst>
+      <p:ext uri="{BB962C8B-B14F-4D97-AF65-F5344CB8AC3E}">
+        <p14:creationId xmlns:p14="http://schemas.microsoft.com/office/powerpoint/2010/main" val="2159035882"/>
+      </p:ext>
+    </p:extLst>
+  </p:cSld>
+  <p:clrMapOvr>
+    <a:masterClrMapping/>
+  </p:clrMapOvr>
+</p:notes>
+</file>
+
+<file path=ppt/notesSlides/notesSlide6.xml><?xml version="1.0" encoding="utf-8"?>
 <p:notes xmlns:a="http://schemas.openxmlformats.org/drawingml/2006/main" xmlns:r="http://schemas.openxmlformats.org/officeDocument/2006/relationships" xmlns:p="http://schemas.openxmlformats.org/presentationml/2006/main">
   <p:cSld>
     <p:spTree>
@@ -1218,7 +2561,7 @@
 </p:notes>
 </file>
 
-<file path=ppt/notesSlides/notesSlide4.xml><?xml version="1.0" encoding="utf-8"?>
+<file path=ppt/notesSlides/notesSlide7.xml><?xml version="1.0" encoding="utf-8"?>
 <p:notes xmlns:a="http://schemas.openxmlformats.org/drawingml/2006/main" xmlns:r="http://schemas.openxmlformats.org/officeDocument/2006/relationships" xmlns:p="http://schemas.openxmlformats.org/presentationml/2006/main">
   <p:cSld>
     <p:spTree>
@@ -1541,7 +2884,7 @@
 </p:notes>
 </file>
 
-<file path=ppt/notesSlides/notesSlide5.xml><?xml version="1.0" encoding="utf-8"?>
+<file path=ppt/notesSlides/notesSlide8.xml><?xml version="1.0" encoding="utf-8"?>
 <p:notes xmlns:a="http://schemas.openxmlformats.org/drawingml/2006/main" xmlns:r="http://schemas.openxmlformats.org/officeDocument/2006/relationships" xmlns:p="http://schemas.openxmlformats.org/presentationml/2006/main" showMasterSp="0" showMasterPhAnim="0">
   <p:cSld>
     <p:spTree>
@@ -1725,7 +3068,7 @@
 </p:notes>
 </file>
 
-<file path=ppt/notesSlides/notesSlide6.xml><?xml version="1.0" encoding="utf-8"?>
+<file path=ppt/notesSlides/notesSlide9.xml><?xml version="1.0" encoding="utf-8"?>
 <p:notes xmlns:a="http://schemas.openxmlformats.org/drawingml/2006/main" xmlns:r="http://schemas.openxmlformats.org/officeDocument/2006/relationships" xmlns:p="http://schemas.openxmlformats.org/presentationml/2006/main" showMasterSp="0" showMasterPhAnim="0">
   <p:cSld>
     <p:spTree>
@@ -1913,671 +3256,6 @@
 </p:notes>
 </file>
 
-<file path=ppt/notesSlides/notesSlide7.xml><?xml version="1.0" encoding="utf-8"?>
-<p:notes xmlns:a="http://schemas.openxmlformats.org/drawingml/2006/main" xmlns:r="http://schemas.openxmlformats.org/officeDocument/2006/relationships" xmlns:p="http://schemas.openxmlformats.org/presentationml/2006/main">
-  <p:cSld>
-    <p:spTree>
-      <p:nvGrpSpPr>
-        <p:cNvPr id="1" name=""/>
-        <p:cNvGrpSpPr/>
-        <p:nvPr/>
-      </p:nvGrpSpPr>
-      <p:grpSpPr>
-        <a:xfrm>
-          <a:off x="0" y="0"/>
-          <a:ext cx="0" cy="0"/>
-          <a:chOff x="0" y="0"/>
-          <a:chExt cx="0" cy="0"/>
-        </a:xfrm>
-      </p:grpSpPr>
-      <p:sp>
-        <p:nvSpPr>
-          <p:cNvPr id="2" name="Slide Image Placeholder 1"/>
-          <p:cNvSpPr>
-            <a:spLocks noGrp="1" noRot="1" noChangeAspect="1"/>
-          </p:cNvSpPr>
-          <p:nvPr>
-            <p:ph type="sldImg" idx="2"/>
-          </p:nvPr>
-        </p:nvSpPr>
-        <p:spPr/>
-      </p:sp>
-      <p:sp>
-        <p:nvSpPr>
-          <p:cNvPr id="3" name="Text Placeholder 2"/>
-          <p:cNvSpPr>
-            <a:spLocks noGrp="1"/>
-          </p:cNvSpPr>
-          <p:nvPr>
-            <p:ph type="body" idx="3"/>
-          </p:nvPr>
-        </p:nvSpPr>
-        <p:spPr/>
-        <p:txBody>
-          <a:bodyPr/>
-          <a:lstStyle/>
-          <a:p>
-            <a:pPr lvl="0"/>
-            <a:r>
-              <a:rPr lang="en-US" altLang="en-US" dirty="0">
-                <a:sym typeface="+mn-ea"/>
-              </a:rPr>
-              <a:t>Harvard Business Review - “How Cloud Computing Is Changing Management” https://</a:t>
-            </a:r>
-            <a:r>
-              <a:rPr lang="en-US" altLang="en-US" dirty="0" err="1">
-                <a:sym typeface="+mn-ea"/>
-              </a:rPr>
-              <a:t>hbr.org</a:t>
-            </a:r>
-            <a:r>
-              <a:rPr lang="en-US" altLang="en-US" dirty="0">
-                <a:sym typeface="+mn-ea"/>
-              </a:rPr>
-              <a:t>/2018/02/how-cloud-computing-is-changing-management</a:t>
-            </a:r>
-          </a:p>
-          <a:p>
-            <a:pPr lvl="0"/>
-            <a:endParaRPr lang="en-US" altLang="en-US" dirty="0">
-              <a:sym typeface="+mn-ea"/>
-            </a:endParaRPr>
-          </a:p>
-          <a:p>
-            <a:pPr lvl="0"/>
-            <a:r>
-              <a:rPr lang="en-US" altLang="en-US" dirty="0">
-                <a:sym typeface="+mn-ea"/>
-              </a:rPr>
-              <a:t>The likely outcomes of the move to cloud include changing how products are designed; where we can experience closer collaboration between IT and other business units, including sales, finance and forecasting; and more customer interaction, even to a point of jointly developing products with their consumers. In particular, new ways of writing and deploying software will encourage new types of faster-acting organizational designs.</a:t>
-            </a:r>
-          </a:p>
-          <a:p>
-            <a:pPr lvl="0"/>
-            <a:endParaRPr lang="en-US" altLang="en-US" dirty="0">
-              <a:sym typeface="+mn-ea"/>
-            </a:endParaRPr>
-          </a:p>
-          <a:p>
-            <a:pPr lvl="0"/>
-            <a:r>
-              <a:rPr lang="en-US" altLang="en-US" dirty="0">
-                <a:sym typeface="+mn-ea"/>
-              </a:rPr>
-              <a:t>And this is a big one - historically IT has been looked at as a cost center (INTERNAL: describe what a cost center is), now there is a distinct shift where IT is generating business again by providing the tools that is allowing the business to grow and innovate at an </a:t>
-            </a:r>
-            <a:r>
-              <a:rPr lang="en-US" altLang="en-US" dirty="0" err="1">
-                <a:sym typeface="+mn-ea"/>
-              </a:rPr>
-              <a:t>unprecidented</a:t>
-            </a:r>
-            <a:r>
-              <a:rPr lang="en-US" altLang="en-US" dirty="0">
-                <a:sym typeface="+mn-ea"/>
-              </a:rPr>
-              <a:t> velocity! Revenue transfer to cloud teams/business unit is a reality.</a:t>
-            </a:r>
-          </a:p>
-          <a:p>
-            <a:pPr lvl="0"/>
-            <a:endParaRPr lang="en-US" altLang="en-US" dirty="0">
-              <a:sym typeface="+mn-ea"/>
-            </a:endParaRPr>
-          </a:p>
-          <a:p>
-            <a:pPr lvl="0"/>
-            <a:r>
-              <a:rPr lang="en-US" altLang="en-US" dirty="0">
-                <a:sym typeface="+mn-ea"/>
-              </a:rPr>
-              <a:t>The shift to “cloud native” organizations - “Cloud native” software approaches stresses ease of use and low-impact alteration of components of any given software application. Massive applications are subdivided into a series of “microservices” that can be tweaked with little effect on a running piece of software.</a:t>
-            </a:r>
-          </a:p>
-          <a:p>
-            <a:pPr lvl="0"/>
-            <a:endParaRPr lang="en-US" altLang="en-US" dirty="0">
-              <a:sym typeface="+mn-ea"/>
-            </a:endParaRPr>
-          </a:p>
-          <a:p>
-            <a:pPr lvl="0"/>
-            <a:r>
-              <a:rPr lang="en-US" altLang="en-US" dirty="0">
-                <a:sym typeface="+mn-ea"/>
-              </a:rPr>
-              <a:t>I have to say this - “IT seems to be not just supporting the business but is helping defining it as well”! Well this is good for us!</a:t>
-            </a:r>
-          </a:p>
-          <a:p>
-            <a:endParaRPr lang="en-US" altLang="en-US" dirty="0"/>
-          </a:p>
-          <a:p>
-            <a:r>
-              <a:rPr lang="en-US" b="1" dirty="0"/>
-              <a:t>Notes:</a:t>
-            </a:r>
-            <a:endParaRPr lang="en-US" dirty="0"/>
-          </a:p>
-          <a:p>
-            <a:pPr>
-              <a:buFont typeface="Arial" panose="020B0604020202020204" pitchFamily="34" charset="0"/>
-              <a:buChar char="•"/>
-            </a:pPr>
-            <a:r>
-              <a:rPr lang="en-US" dirty="0"/>
-              <a:t>Shift to "product" centric thinking which combines business units (and customers!) to jointly develop customer services, and plan for the entire product lifecycle and ongoing financing</a:t>
-            </a:r>
-          </a:p>
-          <a:p>
-            <a:pPr>
-              <a:buFont typeface="Arial" panose="020B0604020202020204" pitchFamily="34" charset="0"/>
-              <a:buChar char="•"/>
-            </a:pPr>
-            <a:r>
-              <a:rPr lang="en-US" dirty="0"/>
-              <a:t>a "project" based thinking approach uses defined </a:t>
-            </a:r>
-            <a:r>
-              <a:rPr lang="en-US" dirty="0" err="1"/>
-              <a:t>timeperiod</a:t>
-            </a:r>
-            <a:r>
-              <a:rPr lang="en-US" dirty="0"/>
-              <a:t> for launches, and features, defined or separate teams (""throw-over the wall" to operations), and struggles with IT financing</a:t>
-            </a:r>
-          </a:p>
-          <a:p>
-            <a:pPr>
-              <a:buFont typeface="Arial" panose="020B0604020202020204" pitchFamily="34" charset="0"/>
-              <a:buChar char="•"/>
-            </a:pPr>
-            <a:r>
-              <a:rPr lang="en-US" dirty="0"/>
-              <a:t>Agile, or incremental approach to services and updates (low-impact and shortened feedback loop approach to testing)</a:t>
-            </a:r>
-          </a:p>
-          <a:p>
-            <a:pPr>
-              <a:buFont typeface="Arial" panose="020B0604020202020204" pitchFamily="34" charset="0"/>
-              <a:buChar char="•"/>
-            </a:pPr>
-            <a:r>
-              <a:rPr lang="en-US" dirty="0"/>
-              <a:t>Cloud first and cloud native thinking</a:t>
-            </a:r>
-          </a:p>
-          <a:p>
-            <a:pPr>
-              <a:buFont typeface="Arial" panose="020B0604020202020204" pitchFamily="34" charset="0"/>
-              <a:buChar char="•"/>
-            </a:pPr>
-            <a:r>
-              <a:rPr lang="en-US" dirty="0"/>
-              <a:t>Microservices (one example) for reduced blast radius, and incremental changes</a:t>
-            </a:r>
-          </a:p>
-          <a:p>
-            <a:pPr>
-              <a:buFont typeface="Arial" panose="020B0604020202020204" pitchFamily="34" charset="0"/>
-              <a:buChar char="•"/>
-            </a:pPr>
-            <a:r>
-              <a:rPr lang="en-US" dirty="0"/>
-              <a:t>Shorter feedback loop</a:t>
-            </a:r>
-          </a:p>
-          <a:p>
-            <a:r>
-              <a:rPr lang="en-US" b="1" dirty="0"/>
-              <a:t>Key Takeaways:</a:t>
-            </a:r>
-            <a:endParaRPr lang="en-US" dirty="0"/>
-          </a:p>
-          <a:p>
-            <a:pPr>
-              <a:buFont typeface="Arial" panose="020B0604020202020204" pitchFamily="34" charset="0"/>
-              <a:buChar char="•"/>
-            </a:pPr>
-            <a:r>
-              <a:rPr lang="en-US" dirty="0"/>
-              <a:t>Focus on product and service, not just single aspect or business unit</a:t>
-            </a:r>
-          </a:p>
-          <a:p>
-            <a:pPr>
-              <a:buFont typeface="Arial" panose="020B0604020202020204" pitchFamily="34" charset="0"/>
-              <a:buChar char="•"/>
-            </a:pPr>
-            <a:r>
-              <a:rPr lang="en-US" dirty="0"/>
-              <a:t>IT as value enabler, not cost center</a:t>
-            </a:r>
-          </a:p>
-          <a:p>
-            <a:pPr>
-              <a:buFont typeface="Arial" panose="020B0604020202020204" pitchFamily="34" charset="0"/>
-              <a:buChar char="•"/>
-            </a:pPr>
-            <a:r>
-              <a:rPr lang="en-US" dirty="0"/>
-              <a:t>Data driven approach to features and changes</a:t>
-            </a:r>
-          </a:p>
-          <a:p>
-            <a:pPr>
-              <a:buFont typeface="Arial" panose="020B0604020202020204" pitchFamily="34" charset="0"/>
-              <a:buChar char="•"/>
-            </a:pPr>
-            <a:r>
-              <a:rPr lang="en-US" dirty="0"/>
-              <a:t>Smaller, more rapid incremental changes</a:t>
-            </a:r>
-          </a:p>
-          <a:p>
-            <a:pPr>
-              <a:buFont typeface="Arial" panose="020B0604020202020204" pitchFamily="34" charset="0"/>
-              <a:buChar char="•"/>
-            </a:pPr>
-            <a:r>
-              <a:rPr lang="en-US" dirty="0"/>
-              <a:t>Shifting to ""cloud native", which is using cloud services first (reduce and eliminate non-differentiated </a:t>
-            </a:r>
-            <a:r>
-              <a:rPr lang="en-US" dirty="0" err="1"/>
-              <a:t>activites</a:t>
-            </a:r>
-            <a:r>
-              <a:rPr lang="en-US" dirty="0"/>
-              <a:t> allowing focus on core business).</a:t>
-            </a:r>
-          </a:p>
-          <a:p>
-            <a:r>
-              <a:rPr lang="en-US" b="1" dirty="0"/>
-              <a:t>References:</a:t>
-            </a:r>
-            <a:endParaRPr lang="en-US" dirty="0"/>
-          </a:p>
-          <a:p>
-            <a:pPr>
-              <a:buFont typeface="Arial" panose="020B0604020202020204" pitchFamily="34" charset="0"/>
-              <a:buChar char="•"/>
-            </a:pPr>
-            <a:r>
-              <a:rPr lang="en-US" dirty="0"/>
-              <a:t>3M Health and Information Systems (healthcare) went all in on AWS.</a:t>
-            </a:r>
-          </a:p>
-          <a:p>
-            <a:pPr>
-              <a:buFont typeface="Arial" panose="020B0604020202020204" pitchFamily="34" charset="0"/>
-              <a:buChar char="•"/>
-            </a:pPr>
-            <a:r>
-              <a:rPr lang="en-US" dirty="0"/>
-              <a:t>not an IT company, allowed focus of R&amp;D on healthcare analytics</a:t>
-            </a:r>
-          </a:p>
-          <a:p>
-            <a:pPr>
-              <a:buFont typeface="Arial" panose="020B0604020202020204" pitchFamily="34" charset="0"/>
-              <a:buChar char="•"/>
-            </a:pPr>
-            <a:r>
-              <a:rPr lang="en-US" dirty="0"/>
-              <a:t>apps are glue between patients, healthcare providers, and payers</a:t>
-            </a:r>
-          </a:p>
-          <a:p>
-            <a:pPr>
-              <a:buFont typeface="Arial" panose="020B0604020202020204" pitchFamily="34" charset="0"/>
-              <a:buChar char="•"/>
-            </a:pPr>
-            <a:r>
-              <a:rPr lang="en-US" dirty="0"/>
-              <a:t>benefits?</a:t>
-            </a:r>
-          </a:p>
-          <a:p>
-            <a:pPr>
-              <a:buFont typeface="Arial" panose="020B0604020202020204" pitchFamily="34" charset="0"/>
-              <a:buChar char="•"/>
-            </a:pPr>
-            <a:r>
-              <a:rPr lang="en-US" dirty="0"/>
-              <a:t>reduced provisioning time from 10+ weeks to minutes allowing focus on other areas</a:t>
-            </a:r>
-          </a:p>
-          <a:p>
-            <a:pPr>
-              <a:buFont typeface="Arial" panose="020B0604020202020204" pitchFamily="34" charset="0"/>
-              <a:buChar char="•"/>
-            </a:pPr>
-            <a:r>
-              <a:rPr lang="en-US" dirty="0"/>
-              <a:t>allow massive scale to support spike in customer demands for large data processing requests</a:t>
-            </a:r>
-          </a:p>
-          <a:p>
-            <a:pPr>
-              <a:buFont typeface="Arial" panose="020B0604020202020204" pitchFamily="34" charset="0"/>
-              <a:buChar char="•"/>
-            </a:pPr>
-            <a:r>
-              <a:rPr lang="en-US" dirty="0"/>
-              <a:t>faster innovation, with deployments down to weekly instead of 6 weeks</a:t>
-            </a:r>
-          </a:p>
-          <a:p>
-            <a:pPr marL="0" lvl="0" indent="0" algn="l" rtl="0">
-              <a:spcBef>
-                <a:spcPts val="0"/>
-              </a:spcBef>
-              <a:spcAft>
-                <a:spcPts val="0"/>
-              </a:spcAft>
-              <a:buNone/>
-            </a:pPr>
-            <a:endParaRPr lang="en-US" dirty="0"/>
-          </a:p>
-          <a:p>
-            <a:endParaRPr lang="en-US" altLang="en-US" dirty="0"/>
-          </a:p>
-        </p:txBody>
-      </p:sp>
-    </p:spTree>
-  </p:cSld>
-  <p:clrMapOvr>
-    <a:masterClrMapping/>
-  </p:clrMapOvr>
-</p:notes>
-</file>
-
-<file path=ppt/notesSlides/notesSlide8.xml><?xml version="1.0" encoding="utf-8"?>
-<p:notes xmlns:a="http://schemas.openxmlformats.org/drawingml/2006/main" xmlns:r="http://schemas.openxmlformats.org/officeDocument/2006/relationships" xmlns:p="http://schemas.openxmlformats.org/presentationml/2006/main">
-  <p:cSld>
-    <p:spTree>
-      <p:nvGrpSpPr>
-        <p:cNvPr id="1" name=""/>
-        <p:cNvGrpSpPr/>
-        <p:nvPr/>
-      </p:nvGrpSpPr>
-      <p:grpSpPr>
-        <a:xfrm>
-          <a:off x="0" y="0"/>
-          <a:ext cx="0" cy="0"/>
-          <a:chOff x="0" y="0"/>
-          <a:chExt cx="0" cy="0"/>
-        </a:xfrm>
-      </p:grpSpPr>
-      <p:sp>
-        <p:nvSpPr>
-          <p:cNvPr id="2" name="Slide Image Placeholder 1"/>
-          <p:cNvSpPr>
-            <a:spLocks noGrp="1" noRot="1" noChangeAspect="1"/>
-          </p:cNvSpPr>
-          <p:nvPr>
-            <p:ph type="sldImg" idx="2"/>
-          </p:nvPr>
-        </p:nvSpPr>
-        <p:spPr/>
-      </p:sp>
-      <p:sp>
-        <p:nvSpPr>
-          <p:cNvPr id="3" name="Text Placeholder 2"/>
-          <p:cNvSpPr>
-            <a:spLocks noGrp="1"/>
-          </p:cNvSpPr>
-          <p:nvPr>
-            <p:ph type="body" idx="3"/>
-          </p:nvPr>
-        </p:nvSpPr>
-        <p:spPr/>
-        <p:txBody>
-          <a:bodyPr/>
-          <a:lstStyle/>
-          <a:p>
-            <a:pPr lvl="0"/>
-            <a:r>
-              <a:rPr lang="en-US" altLang="en-US" dirty="0">
-                <a:sym typeface="+mn-ea"/>
-              </a:rPr>
-              <a:t>Gartner - “Setup your organization for cloud adoption success” https://</a:t>
-            </a:r>
-            <a:r>
-              <a:rPr lang="en-US" altLang="en-US" dirty="0" err="1">
-                <a:sym typeface="+mn-ea"/>
-              </a:rPr>
-              <a:t>www.gartner.com</a:t>
-            </a:r>
-            <a:r>
-              <a:rPr lang="en-US" altLang="en-US" dirty="0">
-                <a:sym typeface="+mn-ea"/>
-              </a:rPr>
-              <a:t>/</a:t>
-            </a:r>
-            <a:r>
-              <a:rPr lang="en-US" altLang="en-US" dirty="0" err="1">
-                <a:sym typeface="+mn-ea"/>
-              </a:rPr>
-              <a:t>en</a:t>
-            </a:r>
-            <a:r>
-              <a:rPr lang="en-US" altLang="en-US" dirty="0">
-                <a:sym typeface="+mn-ea"/>
-              </a:rPr>
-              <a:t>/conferences/hub/cloud-conferences/insights/how-to-build-a-cloud-center-of-excellence</a:t>
-            </a:r>
-          </a:p>
-          <a:p>
-            <a:pPr lvl="0"/>
-            <a:endParaRPr lang="en-US" altLang="en-US" dirty="0">
-              <a:sym typeface="+mn-ea"/>
-            </a:endParaRPr>
-          </a:p>
-          <a:p>
-            <a:pPr lvl="0"/>
-            <a:r>
-              <a:rPr lang="en-US" altLang="en-US" dirty="0">
-                <a:sym typeface="+mn-ea"/>
-              </a:rPr>
-              <a:t>“Enterprise architecture” was and “is” all about business and less about tech. Do you think there is a stark similarity of the enterprise architecture charter with CCOE?</a:t>
-            </a:r>
-          </a:p>
-          <a:p>
-            <a:pPr lvl="0"/>
-            <a:endParaRPr lang="en-US" altLang="en-US" dirty="0">
-              <a:sym typeface="+mn-ea"/>
-            </a:endParaRPr>
-          </a:p>
-          <a:p>
-            <a:pPr lvl="0"/>
-            <a:r>
-              <a:rPr lang="en-US" altLang="en-US" dirty="0">
-                <a:sym typeface="+mn-ea"/>
-              </a:rPr>
-              <a:t>It is also about “Citizen driven development”, give the power at the hands of the grass root foot soldiers, you know like you and me, the people who deliver stuff for our customers. We know what it takes, we know what the problems and how to tackle them. All this knowledge was bottled up, now with democratized tech, we can be product creators! Creators of reusable assets, define best practices, define automation, limitless possibilities! Isn’t it?</a:t>
-            </a:r>
-            <a:endParaRPr lang="en-US" altLang="en-US" dirty="0"/>
-          </a:p>
-          <a:p>
-            <a:endParaRPr lang="en-US" altLang="en-US" dirty="0"/>
-          </a:p>
-          <a:p>
-            <a:r>
-              <a:rPr lang="en-US" b="1" dirty="0"/>
-              <a:t>Notes:</a:t>
-            </a:r>
-            <a:endParaRPr lang="en-US" dirty="0"/>
-          </a:p>
-          <a:p>
-            <a:pPr>
-              <a:buFont typeface="Arial" panose="020B0604020202020204" pitchFamily="34" charset="0"/>
-              <a:buChar char="•"/>
-            </a:pPr>
-            <a:r>
-              <a:rPr lang="en-US" dirty="0"/>
-              <a:t>need right skills and organizational structure</a:t>
-            </a:r>
-          </a:p>
-          <a:p>
-            <a:pPr>
-              <a:buFont typeface="Arial" panose="020B0604020202020204" pitchFamily="34" charset="0"/>
-              <a:buChar char="•"/>
-            </a:pPr>
-            <a:r>
-              <a:rPr lang="en-US" dirty="0"/>
-              <a:t>Will not be as successful (successful) if conforming to old norms, practices, and organization structures</a:t>
-            </a:r>
-          </a:p>
-          <a:p>
-            <a:r>
-              <a:rPr lang="en-US" b="1" dirty="0"/>
-              <a:t>Key </a:t>
-            </a:r>
-            <a:r>
-              <a:rPr lang="en-US" b="1" dirty="0" err="1"/>
-              <a:t>takeways</a:t>
-            </a:r>
-            <a:r>
-              <a:rPr lang="en-US" b="1" dirty="0"/>
-              <a:t>:</a:t>
-            </a:r>
-            <a:endParaRPr lang="en-US" dirty="0"/>
-          </a:p>
-          <a:p>
-            <a:pPr>
-              <a:buFont typeface="Arial" panose="020B0604020202020204" pitchFamily="34" charset="0"/>
-              <a:buChar char="•"/>
-            </a:pPr>
-            <a:r>
-              <a:rPr lang="en-US" dirty="0"/>
-              <a:t>Adopt Cloud Center of Excellence (</a:t>
-            </a:r>
-            <a:r>
-              <a:rPr lang="en-US" dirty="0" err="1"/>
-              <a:t>CCoE</a:t>
-            </a:r>
-            <a:r>
-              <a:rPr lang="en-US" dirty="0"/>
-              <a:t>) to drive practices, provide guidance and oversight and drive innovation</a:t>
-            </a:r>
-          </a:p>
-          <a:p>
-            <a:pPr>
-              <a:buFont typeface="Arial" panose="020B0604020202020204" pitchFamily="34" charset="0"/>
-              <a:buChar char="•"/>
-            </a:pPr>
-            <a:r>
-              <a:rPr lang="en-US" dirty="0"/>
-              <a:t>build up knowledge communities and develop skills</a:t>
-            </a:r>
-          </a:p>
-          <a:p>
-            <a:pPr>
-              <a:buFont typeface="Arial" panose="020B0604020202020204" pitchFamily="34" charset="0"/>
-              <a:buChar char="•"/>
-            </a:pPr>
-            <a:r>
-              <a:rPr lang="en-US" dirty="0"/>
-              <a:t>lunch and learn, developer forums, etc.</a:t>
-            </a:r>
-          </a:p>
-          <a:p>
-            <a:pPr>
-              <a:buFont typeface="Arial" panose="020B0604020202020204" pitchFamily="34" charset="0"/>
-              <a:buChar char="•"/>
-            </a:pPr>
-            <a:r>
-              <a:rPr lang="en-US" dirty="0"/>
-              <a:t>Develop policies, patterns and blueprints, but let teams innovate for their particular use case</a:t>
-            </a:r>
-          </a:p>
-          <a:p>
-            <a:pPr marL="0" lvl="0" indent="0" algn="l" rtl="0">
-              <a:spcBef>
-                <a:spcPts val="0"/>
-              </a:spcBef>
-              <a:spcAft>
-                <a:spcPts val="0"/>
-              </a:spcAft>
-              <a:buNone/>
-            </a:pPr>
-            <a:endParaRPr lang="en-US" dirty="0"/>
-          </a:p>
-          <a:p>
-            <a:endParaRPr lang="en-US" altLang="en-US" dirty="0"/>
-          </a:p>
-        </p:txBody>
-      </p:sp>
-    </p:spTree>
-  </p:cSld>
-  <p:clrMapOvr>
-    <a:masterClrMapping/>
-  </p:clrMapOvr>
-</p:notes>
-</file>
-
-<file path=ppt/notesSlides/notesSlide9.xml><?xml version="1.0" encoding="utf-8"?>
-<p:notes xmlns:a="http://schemas.openxmlformats.org/drawingml/2006/main" xmlns:r="http://schemas.openxmlformats.org/officeDocument/2006/relationships" xmlns:p="http://schemas.openxmlformats.org/presentationml/2006/main">
-  <p:cSld>
-    <p:spTree>
-      <p:nvGrpSpPr>
-        <p:cNvPr id="1" name=""/>
-        <p:cNvGrpSpPr/>
-        <p:nvPr/>
-      </p:nvGrpSpPr>
-      <p:grpSpPr>
-        <a:xfrm>
-          <a:off x="0" y="0"/>
-          <a:ext cx="0" cy="0"/>
-          <a:chOff x="0" y="0"/>
-          <a:chExt cx="0" cy="0"/>
-        </a:xfrm>
-      </p:grpSpPr>
-      <p:sp>
-        <p:nvSpPr>
-          <p:cNvPr id="2" name="Slide Image Placeholder 1"/>
-          <p:cNvSpPr>
-            <a:spLocks noGrp="1" noRot="1" noChangeAspect="1"/>
-          </p:cNvSpPr>
-          <p:nvPr>
-            <p:ph type="sldImg" idx="2"/>
-          </p:nvPr>
-        </p:nvSpPr>
-        <p:spPr/>
-      </p:sp>
-      <p:sp>
-        <p:nvSpPr>
-          <p:cNvPr id="3" name="Text Placeholder 2"/>
-          <p:cNvSpPr>
-            <a:spLocks noGrp="1"/>
-          </p:cNvSpPr>
-          <p:nvPr>
-            <p:ph type="body" idx="3"/>
-          </p:nvPr>
-        </p:nvSpPr>
-        <p:spPr/>
-        <p:txBody>
-          <a:bodyPr/>
-          <a:lstStyle/>
-          <a:p>
-            <a:r>
-              <a:rPr lang="en-US" altLang="en-US"/>
-              <a:t>Reference - https://www.mckinsey.com/business-functions/mckinsey-digital/our-insights/capturing-value-in-the-cloud</a:t>
-            </a:r>
-          </a:p>
-        </p:txBody>
-      </p:sp>
-    </p:spTree>
-  </p:cSld>
-  <p:clrMapOvr>
-    <a:masterClrMapping/>
-  </p:clrMapOvr>
-</p:notes>
-</file>
-
 <file path=ppt/slideLayouts/slideLayout1.xml><?xml version="1.0" encoding="utf-8"?>
 <p:sldLayout xmlns:a="http://schemas.openxmlformats.org/drawingml/2006/main" xmlns:r="http://schemas.openxmlformats.org/officeDocument/2006/relationships" xmlns:p="http://schemas.openxmlformats.org/presentationml/2006/main" type="title" preserve="1">
   <p:cSld name="Title Slide">
@@ -2727,7 +3405,7 @@
           <a:p>
             <a:fld id="{5EA5CFDF-1021-4021-9383-E917CC081235}" type="datetimeFigureOut">
               <a:rPr lang="en-IN" smtClean="0"/>
-              <a:t>18/03/23</a:t>
+              <a:t>01/12/23</a:t>
             </a:fld>
             <a:endParaRPr lang="en-IN"/>
           </a:p>
@@ -2927,7 +3605,7 @@
           <a:p>
             <a:fld id="{5EA5CFDF-1021-4021-9383-E917CC081235}" type="datetimeFigureOut">
               <a:rPr lang="en-IN" smtClean="0"/>
-              <a:t>18/03/23</a:t>
+              <a:t>01/12/23</a:t>
             </a:fld>
             <a:endParaRPr lang="en-IN"/>
           </a:p>
@@ -3137,7 +3815,7 @@
           <a:p>
             <a:fld id="{5EA5CFDF-1021-4021-9383-E917CC081235}" type="datetimeFigureOut">
               <a:rPr lang="en-IN" smtClean="0"/>
-              <a:t>18/03/23</a:t>
+              <a:t>01/12/23</a:t>
             </a:fld>
             <a:endParaRPr lang="en-IN"/>
           </a:p>
@@ -3396,7 +4074,7 @@
           <a:p>
             <a:fld id="{760FBDFE-C587-4B4C-A407-44438C67B59E}" type="datetimeFigureOut">
               <a:rPr lang="zh-CN" altLang="en-US" smtClean="0"/>
-              <a:t>2023/3/18</a:t>
+              <a:t>2023/12/1</a:t>
             </a:fld>
             <a:endParaRPr lang="zh-CN" altLang="en-US"/>
           </a:p>
@@ -3497,7 +4175,7 @@
           <a:p>
             <a:fld id="{5EA5CFDF-1021-4021-9383-E917CC081235}" type="datetimeFigureOut">
               <a:rPr lang="en-IN" smtClean="0"/>
-              <a:t>18/03/23</a:t>
+              <a:t>01/12/23</a:t>
             </a:fld>
             <a:endParaRPr lang="en-IN"/>
           </a:p>
@@ -4040,7 +4718,7 @@
           <a:p>
             <a:fld id="{5EA5CFDF-1021-4021-9383-E917CC081235}" type="datetimeFigureOut">
               <a:rPr lang="en-IN" smtClean="0"/>
-              <a:t>18/03/23</a:t>
+              <a:t>01/12/23</a:t>
             </a:fld>
             <a:endParaRPr lang="en-IN"/>
           </a:p>
@@ -4308,7 +4986,7 @@
           <a:p>
             <a:fld id="{5EA5CFDF-1021-4021-9383-E917CC081235}" type="datetimeFigureOut">
               <a:rPr lang="en-IN" smtClean="0"/>
-              <a:t>18/03/23</a:t>
+              <a:t>01/12/23</a:t>
             </a:fld>
             <a:endParaRPr lang="en-IN"/>
           </a:p>
@@ -4723,7 +5401,7 @@
           <a:p>
             <a:fld id="{5EA5CFDF-1021-4021-9383-E917CC081235}" type="datetimeFigureOut">
               <a:rPr lang="en-IN" smtClean="0"/>
-              <a:t>18/03/23</a:t>
+              <a:t>01/12/23</a:t>
             </a:fld>
             <a:endParaRPr lang="en-IN"/>
           </a:p>
@@ -4865,7 +5543,7 @@
           <a:p>
             <a:fld id="{5EA5CFDF-1021-4021-9383-E917CC081235}" type="datetimeFigureOut">
               <a:rPr lang="en-IN" smtClean="0"/>
-              <a:t>18/03/23</a:t>
+              <a:t>01/12/23</a:t>
             </a:fld>
             <a:endParaRPr lang="en-IN"/>
           </a:p>
@@ -4978,7 +5656,7 @@
           <a:p>
             <a:fld id="{5EA5CFDF-1021-4021-9383-E917CC081235}" type="datetimeFigureOut">
               <a:rPr lang="en-IN" smtClean="0"/>
-              <a:t>18/03/23</a:t>
+              <a:t>01/12/23</a:t>
             </a:fld>
             <a:endParaRPr lang="en-IN"/>
           </a:p>
@@ -5291,7 +5969,7 @@
           <a:p>
             <a:fld id="{5EA5CFDF-1021-4021-9383-E917CC081235}" type="datetimeFigureOut">
               <a:rPr lang="en-IN" smtClean="0"/>
-              <a:t>18/03/23</a:t>
+              <a:t>01/12/23</a:t>
             </a:fld>
             <a:endParaRPr lang="en-IN"/>
           </a:p>
@@ -5580,7 +6258,7 @@
           <a:p>
             <a:fld id="{5EA5CFDF-1021-4021-9383-E917CC081235}" type="datetimeFigureOut">
               <a:rPr lang="en-IN" smtClean="0"/>
-              <a:t>18/03/23</a:t>
+              <a:t>01/12/23</a:t>
             </a:fld>
             <a:endParaRPr lang="en-IN"/>
           </a:p>
@@ -5823,7 +6501,7 @@
           <a:p>
             <a:fld id="{5EA5CFDF-1021-4021-9383-E917CC081235}" type="datetimeFigureOut">
               <a:rPr lang="en-IN" smtClean="0"/>
-              <a:t>18/03/23</a:t>
+              <a:t>01/12/23</a:t>
             </a:fld>
             <a:endParaRPr lang="en-IN"/>
           </a:p>

</xml_diff>